<commit_message>
more work on the advert-based, distributed pilot-store
git-svn-id: file://localhost/tmp/svn2git/svn@3469 defb5e50-622e-49ec-a68e-d72c7db87b45
</commit_message>
<xml_diff>
--- a/applications/pilotstore/doc/pilotstore.pptx
+++ b/applications/pilotstore/doc/pilotstore.pptx
@@ -201,7 +201,7 @@
             <a:fld id="{9A6AC4B2-6F12-454D-8DA7-7B9C78843B81}" type="datetimeFigureOut">
               <a:rPr lang="en-US" smtClean="0"/>
               <a:pPr/>
-              <a:t>14.11.2010</a:t>
+              <a:t>30.11.2010</a:t>
             </a:fld>
             <a:endParaRPr lang="en-US"/>
           </a:p>
@@ -364,7 +364,7 @@
             <a:fld id="{19F24AD4-A78B-B645-8B43-825B1EB2901C}" type="datetimeFigureOut">
               <a:rPr lang="en-US" smtClean="0"/>
               <a:pPr/>
-              <a:t>14.11.2010</a:t>
+              <a:t>30.11.2010</a:t>
             </a:fld>
             <a:endParaRPr lang="en-US"/>
           </a:p>
@@ -4371,7 +4371,7 @@
             <a:fld id="{ADB8239A-D789-5443-937F-338E3AE3D41C}" type="datetime1">
               <a:rPr lang="en-US" smtClean="0"/>
               <a:pPr/>
-              <a:t>14.11.2010</a:t>
+              <a:t>30.11.2010</a:t>
             </a:fld>
             <a:endParaRPr lang="en-US"/>
           </a:p>
@@ -4675,7 +4675,7 @@
             <a:fld id="{459EC1CE-E98D-704D-AD6F-6E3323A36483}" type="datetime1">
               <a:rPr lang="en-US" smtClean="0"/>
               <a:pPr/>
-              <a:t>14.11.2010</a:t>
+              <a:t>30.11.2010</a:t>
             </a:fld>
             <a:endParaRPr lang="en-US"/>
           </a:p>
@@ -4951,7 +4951,7 @@
             <a:fld id="{23E692A5-8B3E-1949-B0CC-6F0593ACFA8E}" type="datetime1">
               <a:rPr lang="en-US" smtClean="0"/>
               <a:pPr/>
-              <a:t>14.11.2010</a:t>
+              <a:t>30.11.2010</a:t>
             </a:fld>
             <a:endParaRPr lang="en-US"/>
           </a:p>
@@ -5243,7 +5243,7 @@
             <a:fld id="{C381DA14-A3C0-9C42-96F2-BEE3D5DE963D}" type="datetime1">
               <a:rPr lang="en-US" smtClean="0"/>
               <a:pPr/>
-              <a:t>14.11.2010</a:t>
+              <a:t>30.11.2010</a:t>
             </a:fld>
             <a:endParaRPr lang="en-US"/>
           </a:p>
@@ -5570,7 +5570,7 @@
             <a:fld id="{33319320-9A5F-694B-B7B5-C734EC93AAA2}" type="datetime1">
               <a:rPr lang="en-US" smtClean="0"/>
               <a:pPr/>
-              <a:t>14.11.2010</a:t>
+              <a:t>30.11.2010</a:t>
             </a:fld>
             <a:endParaRPr lang="en-US"/>
           </a:p>
@@ -5818,7 +5818,7 @@
             <a:fld id="{CF6CE397-A6E6-7547-B24A-92BB5049E0F2}" type="datetime1">
               <a:rPr lang="en-US" smtClean="0"/>
               <a:pPr/>
-              <a:t>14.11.2010</a:t>
+              <a:t>30.11.2010</a:t>
             </a:fld>
             <a:endParaRPr lang="en-US"/>
           </a:p>
@@ -5995,7 +5995,7 @@
             <a:fld id="{27AB7D46-BD5E-E641-9118-DCE28F3B83FA}" type="datetime1">
               <a:rPr lang="en-US" smtClean="0"/>
               <a:pPr/>
-              <a:t>14.11.2010</a:t>
+              <a:t>30.11.2010</a:t>
             </a:fld>
             <a:endParaRPr lang="en-US"/>
           </a:p>
@@ -6223,7 +6223,7 @@
             <a:fld id="{BC26097E-015C-3B4D-86C1-CD2AD30F0B81}" type="datetime1">
               <a:rPr lang="en-US" smtClean="0"/>
               <a:pPr/>
-              <a:t>14.11.2010</a:t>
+              <a:t>30.11.2010</a:t>
             </a:fld>
             <a:endParaRPr lang="en-US"/>
           </a:p>
@@ -6499,7 +6499,7 @@
             <a:fld id="{ED6649F4-2545-3040-B7BD-803CA59D50C7}" type="datetime1">
               <a:rPr lang="en-US" smtClean="0"/>
               <a:pPr/>
-              <a:t>14.11.2010</a:t>
+              <a:t>30.11.2010</a:t>
             </a:fld>
             <a:endParaRPr lang="en-US"/>
           </a:p>
@@ -6807,7 +6807,7 @@
             <a:fld id="{833A9088-CEDD-2F48-A9A0-611A3CC03FE9}" type="datetime1">
               <a:rPr lang="en-US" smtClean="0"/>
               <a:pPr/>
-              <a:t>14.11.2010</a:t>
+              <a:t>30.11.2010</a:t>
             </a:fld>
             <a:endParaRPr lang="en-US"/>
           </a:p>
@@ -7101,7 +7101,7 @@
             <a:fld id="{AED87ACF-EB3C-EA42-8610-542FB50388EB}" type="datetime1">
               <a:rPr lang="en-US" smtClean="0"/>
               <a:pPr/>
-              <a:t>14.11.2010</a:t>
+              <a:t>30.11.2010</a:t>
             </a:fld>
             <a:endParaRPr lang="en-US"/>
           </a:p>
@@ -7533,7 +7533,7 @@
             <a:fld id="{0E0DC31B-692F-774E-A937-DA560DE61DA8}" type="datetime1">
               <a:rPr lang="en-US" smtClean="0"/>
               <a:pPr/>
-              <a:t>14.11.2010</a:t>
+              <a:t>30.11.2010</a:t>
             </a:fld>
             <a:endParaRPr lang="en-US"/>
           </a:p>
@@ -7881,7 +7881,7 @@
             <a:fld id="{95DEFDAE-5BDC-1B4F-BC4C-23C867CEBC21}" type="datetime1">
               <a:rPr lang="en-US" smtClean="0"/>
               <a:pPr/>
-              <a:t>14.11.2010</a:t>
+              <a:t>30.11.2010</a:t>
             </a:fld>
             <a:endParaRPr lang="en-US"/>
           </a:p>
@@ -7973,7 +7973,7 @@
             <a:fld id="{9F53C516-787B-9A45-AFCF-5D75DD78DEBE}" type="datetime1">
               <a:rPr lang="en-US" smtClean="0"/>
               <a:pPr/>
-              <a:t>14.11.2010</a:t>
+              <a:t>30.11.2010</a:t>
             </a:fld>
             <a:endParaRPr lang="en-US"/>
           </a:p>
@@ -8312,7 +8312,7 @@
             <a:fld id="{F19CAA94-9393-BB4A-8CB6-008B1351A132}" type="datetime1">
               <a:rPr lang="en-US" smtClean="0"/>
               <a:pPr/>
-              <a:t>14.11.2010</a:t>
+              <a:t>30.11.2010</a:t>
             </a:fld>
             <a:endParaRPr lang="en-US"/>
           </a:p>
@@ -8526,7 +8526,7 @@
             <a:fld id="{A3476A5E-2ED6-7749-A8C1-D0B1EEEB97E0}" type="datetime1">
               <a:rPr lang="en-US" smtClean="0"/>
               <a:pPr/>
-              <a:t>14.11.2010</a:t>
+              <a:t>30.11.2010</a:t>
             </a:fld>
             <a:endParaRPr lang="en-US"/>
           </a:p>
@@ -9334,11 +9334,7 @@
             <a:pPr lvl="1"/>
             <a:r>
               <a:rPr lang="en-US" sz="2400" dirty="0" smtClean="0"/>
-              <a:t>Pilot Data can be used to create groups of file that</a:t>
-            </a:r>
-            <a:r>
-              <a:rPr lang="en-US" sz="2400" dirty="0" smtClean="0"/>
-              <a:t> are always used together </a:t>
+              <a:t>Pilot Data can be used to create groups of file that are always used together </a:t>
             </a:r>
             <a:r>
               <a:rPr lang="de-DE" sz="2400" dirty="0" smtClean="0"/>
@@ -9360,7 +9356,6 @@
               <a:rPr lang="de-DE" sz="2400" dirty="0" smtClean="0"/>
               <a:t> 2008)</a:t>
             </a:r>
-            <a:endParaRPr lang="de-DE" sz="2400" dirty="0" smtClean="0"/>
           </a:p>
           <a:p>
             <a:pPr lvl="1"/>
@@ -9372,21 +9367,8 @@
           <a:p>
             <a:r>
               <a:rPr lang="en-US" sz="2400" dirty="0" smtClean="0"/>
-              <a:t>Pilot Store: A container that represents a logical group</a:t>
-            </a:r>
-            <a:r>
-              <a:rPr lang="en-US" sz="2400" dirty="0" smtClean="0"/>
-              <a:t> of </a:t>
-            </a:r>
-            <a:r>
-              <a:rPr lang="en-US" sz="2400" dirty="0" smtClean="0"/>
-              <a:t>physical </a:t>
-            </a:r>
-            <a:r>
-              <a:rPr lang="en-US" sz="2400" dirty="0" smtClean="0"/>
-              <a:t>files that share the same affinity.</a:t>
-            </a:r>
-            <a:endParaRPr lang="en-US" sz="2400" dirty="0" smtClean="0"/>
+              <a:t>Pilot Store: A container that represents a logical group of physical files that share the same affinity.</a:t>
+            </a:r>
           </a:p>
           <a:p>
             <a:endParaRPr lang="en-US" dirty="0"/>
@@ -9862,11 +9844,7 @@
             </a:r>
             <a:r>
               <a:rPr lang="en-US" dirty="0" smtClean="0"/>
-              <a:t>. </a:t>
-            </a:r>
-            <a:r>
-              <a:rPr lang="en-US" dirty="0" smtClean="0"/>
-              <a:t>Sub-Jobs will be transparently distributed across all </a:t>
+              <a:t>. Sub-Jobs will be transparently distributed across all </a:t>
             </a:r>
             <a:r>
               <a:rPr lang="en-US" dirty="0" err="1" smtClean="0"/>
@@ -10027,6 +10005,28 @@
           </a:bodyPr>
           <a:lstStyle/>
           <a:p>
+            <a:pPr marL="342900" lvl="1" indent="-342900">
+              <a:spcBef>
+                <a:spcPts val="2000"/>
+              </a:spcBef>
+              <a:buClr>
+                <a:srgbClr val="8BACBD"/>
+              </a:buClr>
+            </a:pPr>
+            <a:r>
+              <a:rPr lang="en-US" dirty="0" smtClean="0"/>
+              <a:t>The current framework provides building blocks for expressing data localities and operation on file groups (DPA book: </a:t>
+            </a:r>
+            <a:r>
+              <a:rPr lang="en-US" dirty="0" err="1" smtClean="0"/>
+              <a:t>filecule</a:t>
+            </a:r>
+            <a:r>
+              <a:rPr lang="en-US" dirty="0" smtClean="0"/>
+              <a:t>).</a:t>
+            </a:r>
+          </a:p>
+          <a:p>
             <a:r>
               <a:rPr lang="en-US" dirty="0" smtClean="0"/>
               <a:t>Limitations:</a:t>
@@ -10036,21 +10036,6 @@
             <a:pPr lvl="1"/>
             <a:r>
               <a:rPr lang="en-US" dirty="0" smtClean="0"/>
-              <a:t>The current framework provides building blocks for expressing data localities and operation on file groups (DPA book: </a:t>
-            </a:r>
-            <a:r>
-              <a:rPr lang="en-US" dirty="0" err="1" smtClean="0"/>
-              <a:t>filecule</a:t>
-            </a:r>
-            <a:r>
-              <a:rPr lang="en-US" dirty="0" smtClean="0"/>
-              <a:t>).</a:t>
-            </a:r>
-          </a:p>
-          <a:p>
-            <a:pPr lvl="1"/>
-            <a:r>
-              <a:rPr lang="en-US" dirty="0" smtClean="0"/>
               <a:t>No active agent that monitors state of files</a:t>
             </a:r>
           </a:p>
@@ -10123,11 +10108,7 @@
             <a:pPr lvl="1"/>
             <a:r>
               <a:rPr lang="en-US" dirty="0" smtClean="0"/>
-              <a:t>Identification of the same file: logical filename -&gt; physical </a:t>
-            </a:r>
-            <a:r>
-              <a:rPr lang="en-US" dirty="0" smtClean="0"/>
-              <a:t>files</a:t>
+              <a:t>Identification of the same file: logical filename -&gt; physical files</a:t>
             </a:r>
           </a:p>
           <a:p>
@@ -10136,7 +10117,6 @@
               <a:rPr lang="en-US" dirty="0" smtClean="0"/>
               <a:t>Manage replication process (consistency!)</a:t>
             </a:r>
-            <a:endParaRPr lang="en-US" dirty="0" smtClean="0"/>
           </a:p>
           <a:p>
             <a:endParaRPr lang="en-US" dirty="0"/>

</xml_diff>